<commit_message>
final seminar version and draft slides
</commit_message>
<xml_diff>
--- a/Final_submission/presentation_draft.pptx
+++ b/Final_submission/presentation_draft.pptx
@@ -5,7 +5,7 @@
     <p:sldMasterId id="2147483663" r:id="rId1"/>
   </p:sldMasterIdLst>
   <p:notesMasterIdLst>
-    <p:notesMasterId r:id="rId8"/>
+    <p:notesMasterId r:id="rId13"/>
   </p:notesMasterIdLst>
   <p:sldIdLst>
     <p:sldId id="256" r:id="rId2"/>
@@ -14,11 +14,16 @@
     <p:sldId id="259" r:id="rId5"/>
     <p:sldId id="260" r:id="rId6"/>
     <p:sldId id="261" r:id="rId7"/>
+    <p:sldId id="262" r:id="rId8"/>
+    <p:sldId id="263" r:id="rId9"/>
+    <p:sldId id="264" r:id="rId10"/>
+    <p:sldId id="265" r:id="rId11"/>
+    <p:sldId id="266" r:id="rId12"/>
   </p:sldIdLst>
   <p:sldSz cx="9144000" cy="6858000" type="screen4x3"/>
   <p:notesSz cx="10234613" cy="7099300"/>
   <p:custDataLst>
-    <p:tags r:id="rId9"/>
+    <p:tags r:id="rId14"/>
   </p:custDataLst>
   <p:defaultTextStyle>
     <a:defPPr>
@@ -259,7 +264,7 @@
           <a:effectLst/>
           <a:extLst>
             <a:ext uri="{91240B29-F687-4f45-9708-019B960494DF}">
-              <a14:hiddenLine xmlns:a14="http://schemas.microsoft.com/office/drawing/2010/main" xmlns="" w="9525">
+              <a14:hiddenLine xmlns="" xmlns:a14="http://schemas.microsoft.com/office/drawing/2010/main" w="9525">
                 <a:solidFill>
                   <a:srgbClr val="000000"/>
                 </a:solidFill>
@@ -269,7 +274,7 @@
               </a14:hiddenLine>
             </a:ext>
             <a:ext uri="{AF507438-7753-43e0-B8FC-AC1667EBCBE1}">
-              <a14:hiddenEffects xmlns:a14="http://schemas.microsoft.com/office/drawing/2010/main" xmlns="">
+              <a14:hiddenEffects xmlns="" xmlns:a14="http://schemas.microsoft.com/office/drawing/2010/main">
                 <a:effectLst>
                   <a:outerShdw dist="35921" dir="2700000" algn="ctr" rotWithShape="0">
                     <a:srgbClr val="808080"/>
@@ -312,14 +317,14 @@
           <a:effectLst/>
           <a:extLst>
             <a:ext uri="{909E8E84-426E-40dd-AFC4-6F175D3DCCD1}">
-              <a14:hiddenFill xmlns:a14="http://schemas.microsoft.com/office/drawing/2010/main" xmlns="">
+              <a14:hiddenFill xmlns="" xmlns:a14="http://schemas.microsoft.com/office/drawing/2010/main">
                 <a:solidFill>
                   <a:srgbClr val="FFFFFF"/>
                 </a:solidFill>
               </a14:hiddenFill>
             </a:ext>
             <a:ext uri="{91240B29-F687-4f45-9708-019B960494DF}">
-              <a14:hiddenLine xmlns:a14="http://schemas.microsoft.com/office/drawing/2010/main" xmlns="" w="9525">
+              <a14:hiddenLine xmlns="" xmlns:a14="http://schemas.microsoft.com/office/drawing/2010/main" w="9525">
                 <a:solidFill>
                   <a:srgbClr val="000000"/>
                 </a:solidFill>
@@ -329,7 +334,7 @@
               </a14:hiddenLine>
             </a:ext>
             <a:ext uri="{AF507438-7753-43e0-B8FC-AC1667EBCBE1}">
-              <a14:hiddenEffects xmlns:a14="http://schemas.microsoft.com/office/drawing/2010/main" xmlns="">
+              <a14:hiddenEffects xmlns="" xmlns:a14="http://schemas.microsoft.com/office/drawing/2010/main">
                 <a:effectLst>
                   <a:outerShdw dist="35921" dir="2700000" algn="ctr" rotWithShape="0">
                     <a:schemeClr val="bg2"/>
@@ -397,14 +402,14 @@
           <a:effectLst/>
           <a:extLst>
             <a:ext uri="{909E8E84-426E-40dd-AFC4-6F175D3DCCD1}">
-              <a14:hiddenFill xmlns:a14="http://schemas.microsoft.com/office/drawing/2010/main" xmlns="">
+              <a14:hiddenFill xmlns="" xmlns:a14="http://schemas.microsoft.com/office/drawing/2010/main">
                 <a:solidFill>
                   <a:srgbClr val="FFFFFF"/>
                 </a:solidFill>
               </a14:hiddenFill>
             </a:ext>
             <a:ext uri="{91240B29-F687-4f45-9708-019B960494DF}">
-              <a14:hiddenLine xmlns:a14="http://schemas.microsoft.com/office/drawing/2010/main" xmlns="" w="9525">
+              <a14:hiddenLine xmlns="" xmlns:a14="http://schemas.microsoft.com/office/drawing/2010/main" w="9525">
                 <a:solidFill>
                   <a:srgbClr val="000000"/>
                 </a:solidFill>
@@ -414,7 +419,7 @@
               </a14:hiddenLine>
             </a:ext>
             <a:ext uri="{AF507438-7753-43e0-B8FC-AC1667EBCBE1}">
-              <a14:hiddenEffects xmlns:a14="http://schemas.microsoft.com/office/drawing/2010/main" xmlns="">
+              <a14:hiddenEffects xmlns="" xmlns:a14="http://schemas.microsoft.com/office/drawing/2010/main">
                 <a:effectLst>
                   <a:outerShdw dist="35921" dir="2700000" algn="ctr" rotWithShape="0">
                     <a:schemeClr val="bg2"/>
@@ -482,14 +487,14 @@
           <a:effectLst/>
           <a:extLst>
             <a:ext uri="{909E8E84-426E-40dd-AFC4-6F175D3DCCD1}">
-              <a14:hiddenFill xmlns:a14="http://schemas.microsoft.com/office/drawing/2010/main" xmlns="">
+              <a14:hiddenFill xmlns="" xmlns:a14="http://schemas.microsoft.com/office/drawing/2010/main">
                 <a:solidFill>
                   <a:srgbClr val="FFFFFF"/>
                 </a:solidFill>
               </a14:hiddenFill>
             </a:ext>
             <a:ext uri="{91240B29-F687-4f45-9708-019B960494DF}">
-              <a14:hiddenLine xmlns:a14="http://schemas.microsoft.com/office/drawing/2010/main" xmlns="" w="9525">
+              <a14:hiddenLine xmlns="" xmlns:a14="http://schemas.microsoft.com/office/drawing/2010/main" w="9525">
                 <a:solidFill>
                   <a:srgbClr val="000000"/>
                 </a:solidFill>
@@ -499,7 +504,7 @@
               </a14:hiddenLine>
             </a:ext>
             <a:ext uri="{AF507438-7753-43e0-B8FC-AC1667EBCBE1}">
-              <a14:hiddenEffects xmlns:a14="http://schemas.microsoft.com/office/drawing/2010/main" xmlns="">
+              <a14:hiddenEffects xmlns="" xmlns:a14="http://schemas.microsoft.com/office/drawing/2010/main">
                 <a:effectLst>
                   <a:outerShdw dist="35921" dir="2700000" algn="ctr" rotWithShape="0">
                     <a:schemeClr val="bg2"/>
@@ -535,14 +540,14 @@
           <a:effectLst/>
           <a:extLst>
             <a:ext uri="{909E8E84-426E-40dd-AFC4-6F175D3DCCD1}">
-              <a14:hiddenFill xmlns:a14="http://schemas.microsoft.com/office/drawing/2010/main" xmlns="">
+              <a14:hiddenFill xmlns="" xmlns:a14="http://schemas.microsoft.com/office/drawing/2010/main">
                 <a:solidFill>
                   <a:srgbClr val="FFFFFF"/>
                 </a:solidFill>
               </a14:hiddenFill>
             </a:ext>
             <a:ext uri="{91240B29-F687-4f45-9708-019B960494DF}">
-              <a14:hiddenLine xmlns:a14="http://schemas.microsoft.com/office/drawing/2010/main" xmlns="" w="9525">
+              <a14:hiddenLine xmlns="" xmlns:a14="http://schemas.microsoft.com/office/drawing/2010/main" w="9525">
                 <a:solidFill>
                   <a:srgbClr val="000000"/>
                 </a:solidFill>
@@ -552,7 +557,7 @@
               </a14:hiddenLine>
             </a:ext>
             <a:ext uri="{AF507438-7753-43e0-B8FC-AC1667EBCBE1}">
-              <a14:hiddenEffects xmlns:a14="http://schemas.microsoft.com/office/drawing/2010/main" xmlns="">
+              <a14:hiddenEffects xmlns="" xmlns:a14="http://schemas.microsoft.com/office/drawing/2010/main">
                 <a:effectLst>
                   <a:outerShdw dist="35921" dir="2700000" algn="ctr" rotWithShape="0">
                     <a:schemeClr val="bg2"/>
@@ -600,14 +605,14 @@
           <a:effectLst/>
           <a:extLst>
             <a:ext uri="{909E8E84-426E-40dd-AFC4-6F175D3DCCD1}">
-              <a14:hiddenFill xmlns:a14="http://schemas.microsoft.com/office/drawing/2010/main" xmlns="">
+              <a14:hiddenFill xmlns="" xmlns:a14="http://schemas.microsoft.com/office/drawing/2010/main">
                 <a:solidFill>
                   <a:srgbClr val="FFFFFF"/>
                 </a:solidFill>
               </a14:hiddenFill>
             </a:ext>
             <a:ext uri="{91240B29-F687-4f45-9708-019B960494DF}">
-              <a14:hiddenLine xmlns:a14="http://schemas.microsoft.com/office/drawing/2010/main" xmlns="" w="9525">
+              <a14:hiddenLine xmlns="" xmlns:a14="http://schemas.microsoft.com/office/drawing/2010/main" w="9525">
                 <a:solidFill>
                   <a:srgbClr val="000000"/>
                 </a:solidFill>
@@ -617,7 +622,7 @@
               </a14:hiddenLine>
             </a:ext>
             <a:ext uri="{AF507438-7753-43e0-B8FC-AC1667EBCBE1}">
-              <a14:hiddenEffects xmlns:a14="http://schemas.microsoft.com/office/drawing/2010/main" xmlns="">
+              <a14:hiddenEffects xmlns="" xmlns:a14="http://schemas.microsoft.com/office/drawing/2010/main">
                 <a:effectLst>
                   <a:outerShdw dist="35921" dir="2700000" algn="ctr" rotWithShape="0">
                     <a:schemeClr val="bg2"/>
@@ -685,14 +690,14 @@
           <a:effectLst/>
           <a:extLst>
             <a:ext uri="{909E8E84-426E-40dd-AFC4-6F175D3DCCD1}">
-              <a14:hiddenFill xmlns:a14="http://schemas.microsoft.com/office/drawing/2010/main" xmlns="">
+              <a14:hiddenFill xmlns="" xmlns:a14="http://schemas.microsoft.com/office/drawing/2010/main">
                 <a:solidFill>
                   <a:srgbClr val="FFFFFF"/>
                 </a:solidFill>
               </a14:hiddenFill>
             </a:ext>
             <a:ext uri="{91240B29-F687-4f45-9708-019B960494DF}">
-              <a14:hiddenLine xmlns:a14="http://schemas.microsoft.com/office/drawing/2010/main" xmlns="" w="9525">
+              <a14:hiddenLine xmlns="" xmlns:a14="http://schemas.microsoft.com/office/drawing/2010/main" w="9525">
                 <a:solidFill>
                   <a:srgbClr val="000000"/>
                 </a:solidFill>
@@ -702,7 +707,7 @@
               </a14:hiddenLine>
             </a:ext>
             <a:ext uri="{AF507438-7753-43e0-B8FC-AC1667EBCBE1}">
-              <a14:hiddenEffects xmlns:a14="http://schemas.microsoft.com/office/drawing/2010/main" xmlns="">
+              <a14:hiddenEffects xmlns="" xmlns:a14="http://schemas.microsoft.com/office/drawing/2010/main">
                 <a:effectLst>
                   <a:outerShdw dist="35921" dir="2700000" algn="ctr" rotWithShape="0">
                     <a:schemeClr val="bg2"/>
@@ -4717,6 +4722,203 @@
 </p:sld>
 </file>
 
+<file path=ppt/slides/slide10.xml><?xml version="1.0" encoding="utf-8"?>
+<p:sld xmlns:a="http://schemas.openxmlformats.org/drawingml/2006/main" xmlns:r="http://schemas.openxmlformats.org/officeDocument/2006/relationships" xmlns:p="http://schemas.openxmlformats.org/presentationml/2006/main">
+  <p:cSld>
+    <p:spTree>
+      <p:nvGrpSpPr>
+        <p:cNvPr id="1" name=""/>
+        <p:cNvGrpSpPr/>
+        <p:nvPr/>
+      </p:nvGrpSpPr>
+      <p:grpSpPr>
+        <a:xfrm>
+          <a:off x="0" y="0"/>
+          <a:ext cx="0" cy="0"/>
+          <a:chOff x="0" y="0"/>
+          <a:chExt cx="0" cy="0"/>
+        </a:xfrm>
+      </p:grpSpPr>
+      <p:sp>
+        <p:nvSpPr>
+          <p:cNvPr id="2" name="Title 1">
+            <a:extLst>
+              <a:ext uri="{FF2B5EF4-FFF2-40B4-BE49-F238E27FC236}">
+                <a16:creationId xmlns:a16="http://schemas.microsoft.com/office/drawing/2014/main" id="{15E05A02-1779-4B44-BC04-2E68E5C6579D}"/>
+              </a:ext>
+            </a:extLst>
+          </p:cNvPr>
+          <p:cNvSpPr>
+            <a:spLocks noGrp="1"/>
+          </p:cNvSpPr>
+          <p:nvPr>
+            <p:ph type="title"/>
+          </p:nvPr>
+        </p:nvSpPr>
+        <p:spPr/>
+        <p:txBody>
+          <a:bodyPr/>
+          <a:lstStyle/>
+          <a:p>
+            <a:r>
+              <a:rPr lang="en-DE" dirty="0"/>
+              <a:t>Conclusion</a:t>
+            </a:r>
+          </a:p>
+        </p:txBody>
+      </p:sp>
+      <p:sp>
+        <p:nvSpPr>
+          <p:cNvPr id="3" name="Content Placeholder 2">
+            <a:extLst>
+              <a:ext uri="{FF2B5EF4-FFF2-40B4-BE49-F238E27FC236}">
+                <a16:creationId xmlns:a16="http://schemas.microsoft.com/office/drawing/2014/main" id="{5AFE2D61-D58E-5345-97F2-891D4EE6D6B3}"/>
+              </a:ext>
+            </a:extLst>
+          </p:cNvPr>
+          <p:cNvSpPr>
+            <a:spLocks noGrp="1"/>
+          </p:cNvSpPr>
+          <p:nvPr>
+            <p:ph idx="1"/>
+          </p:nvPr>
+        </p:nvSpPr>
+        <p:spPr/>
+        <p:txBody>
+          <a:bodyPr/>
+          <a:lstStyle/>
+          <a:p>
+            <a:r>
+              <a:rPr lang="en-DE" dirty="0"/>
+              <a:t>Conclusion </a:t>
+            </a:r>
+          </a:p>
+          <a:p>
+            <a:pPr lvl="1"/>
+            <a:r>
+              <a:rPr lang="en-DE" dirty="0"/>
+              <a:t>Network-based Scheduler adds extra execution time</a:t>
+            </a:r>
+          </a:p>
+          <a:p>
+            <a:pPr lvl="1"/>
+            <a:r>
+              <a:rPr lang="en-DE" dirty="0"/>
+              <a:t>Optimized technique considering default scheduler</a:t>
+            </a:r>
+          </a:p>
+          <a:p>
+            <a:pPr lvl="1"/>
+            <a:r>
+              <a:rPr lang="en-DE" dirty="0"/>
+              <a:t>Works along side the default scheduler</a:t>
+            </a:r>
+          </a:p>
+          <a:p>
+            <a:pPr lvl="1"/>
+            <a:endParaRPr lang="en-DE" dirty="0"/>
+          </a:p>
+        </p:txBody>
+      </p:sp>
+    </p:spTree>
+    <p:extLst>
+      <p:ext uri="{BB962C8B-B14F-4D97-AF65-F5344CB8AC3E}">
+        <p14:creationId xmlns:p14="http://schemas.microsoft.com/office/powerpoint/2010/main" val="2995853176"/>
+      </p:ext>
+    </p:extLst>
+  </p:cSld>
+  <p:clrMapOvr>
+    <a:masterClrMapping/>
+  </p:clrMapOvr>
+</p:sld>
+</file>
+
+<file path=ppt/slides/slide11.xml><?xml version="1.0" encoding="utf-8"?>
+<p:sld xmlns:a="http://schemas.openxmlformats.org/drawingml/2006/main" xmlns:r="http://schemas.openxmlformats.org/officeDocument/2006/relationships" xmlns:p="http://schemas.openxmlformats.org/presentationml/2006/main">
+  <p:cSld>
+    <p:spTree>
+      <p:nvGrpSpPr>
+        <p:cNvPr id="1" name=""/>
+        <p:cNvGrpSpPr/>
+        <p:nvPr/>
+      </p:nvGrpSpPr>
+      <p:grpSpPr>
+        <a:xfrm>
+          <a:off x="0" y="0"/>
+          <a:ext cx="0" cy="0"/>
+          <a:chOff x="0" y="0"/>
+          <a:chExt cx="0" cy="0"/>
+        </a:xfrm>
+      </p:grpSpPr>
+      <p:sp>
+        <p:nvSpPr>
+          <p:cNvPr id="2" name="Title 1">
+            <a:extLst>
+              <a:ext uri="{FF2B5EF4-FFF2-40B4-BE49-F238E27FC236}">
+                <a16:creationId xmlns:a16="http://schemas.microsoft.com/office/drawing/2014/main" id="{F438E8EF-4962-8042-8C93-8A91215050E9}"/>
+              </a:ext>
+            </a:extLst>
+          </p:cNvPr>
+          <p:cNvSpPr>
+            <a:spLocks noGrp="1"/>
+          </p:cNvSpPr>
+          <p:nvPr>
+            <p:ph type="title"/>
+          </p:nvPr>
+        </p:nvSpPr>
+        <p:spPr/>
+        <p:txBody>
+          <a:bodyPr/>
+          <a:lstStyle/>
+          <a:p>
+            <a:r>
+              <a:rPr lang="en-DE" dirty="0"/>
+              <a:t>References</a:t>
+            </a:r>
+          </a:p>
+        </p:txBody>
+      </p:sp>
+      <p:sp>
+        <p:nvSpPr>
+          <p:cNvPr id="3" name="Content Placeholder 2">
+            <a:extLst>
+              <a:ext uri="{FF2B5EF4-FFF2-40B4-BE49-F238E27FC236}">
+                <a16:creationId xmlns:a16="http://schemas.microsoft.com/office/drawing/2014/main" id="{B95AAB67-553F-5349-A3EC-1EA9200F7882}"/>
+              </a:ext>
+            </a:extLst>
+          </p:cNvPr>
+          <p:cNvSpPr>
+            <a:spLocks noGrp="1"/>
+          </p:cNvSpPr>
+          <p:nvPr>
+            <p:ph idx="1"/>
+          </p:nvPr>
+        </p:nvSpPr>
+        <p:spPr/>
+        <p:txBody>
+          <a:bodyPr/>
+          <a:lstStyle/>
+          <a:p>
+            <a:r>
+              <a:rPr lang="en-DE" dirty="0"/>
+              <a:t>Added after advisor reviews</a:t>
+            </a:r>
+          </a:p>
+        </p:txBody>
+      </p:sp>
+    </p:spTree>
+    <p:extLst>
+      <p:ext uri="{BB962C8B-B14F-4D97-AF65-F5344CB8AC3E}">
+        <p14:creationId xmlns:p14="http://schemas.microsoft.com/office/powerpoint/2010/main" val="2108283478"/>
+      </p:ext>
+    </p:extLst>
+  </p:cSld>
+  <p:clrMapOvr>
+    <a:masterClrMapping/>
+  </p:clrMapOvr>
+</p:sld>
+</file>
+
 <file path=ppt/slides/slide2.xml><?xml version="1.0" encoding="utf-8"?>
 <p:sld xmlns:a="http://schemas.openxmlformats.org/drawingml/2006/main" xmlns:r="http://schemas.openxmlformats.org/officeDocument/2006/relationships" xmlns:p="http://schemas.openxmlformats.org/presentationml/2006/main">
   <p:cSld>
@@ -4815,13 +5017,13 @@
           <a:p>
             <a:r>
               <a:rPr lang="en-DE" dirty="0"/>
-              <a:t>Comparison of new scheduling technique with default scheduler.</a:t>
+              <a:t>Comparison of new scheduling technique with other solutions.</a:t>
             </a:r>
           </a:p>
           <a:p>
             <a:r>
               <a:rPr lang="en-DE" dirty="0"/>
-              <a:t>Conclusion and Future work.</a:t>
+              <a:t>Conclusion.</a:t>
             </a:r>
           </a:p>
           <a:p>
@@ -4913,7 +5115,7 @@
           <a:p>
             <a:r>
               <a:rPr lang="en-DE" dirty="0"/>
-              <a:t>Idea</a:t>
+              <a:t>Concept of Fog Compuing</a:t>
             </a:r>
           </a:p>
           <a:p>
@@ -4952,7 +5154,14 @@
             <a:pPr lvl="1"/>
             <a:r>
               <a:rPr lang="en-DE" dirty="0"/>
-              <a:t>Cloud Infrastructure: OpenStack, AWS</a:t>
+              <a:t>Cloud: OpenStack, AWS</a:t>
+            </a:r>
+          </a:p>
+          <a:p>
+            <a:pPr lvl="1"/>
+            <a:r>
+              <a:rPr lang="en-DE" dirty="0"/>
+              <a:t>Containers: Kubernetes, Docker Swarn</a:t>
             </a:r>
           </a:p>
           <a:p>
@@ -4992,8 +5201,8 @@
         </p:blipFill>
         <p:spPr>
           <a:xfrm>
-            <a:off x="5422582" y="3789040"/>
-            <a:ext cx="3613914" cy="2160240"/>
+            <a:off x="5555208" y="987999"/>
+            <a:ext cx="3481288" cy="2080961"/>
           </a:xfrm>
           <a:prstGeom prst="rect">
             <a:avLst/>
@@ -5106,12 +5315,69 @@
           </a:p>
           <a:p>
             <a:pPr lvl="1"/>
-            <a:endParaRPr lang="en-GB" dirty="0"/>
+            <a:r>
+              <a:rPr lang="en-GB" i="1" dirty="0"/>
+              <a:t>Controller Manager</a:t>
+            </a:r>
+          </a:p>
+          <a:p>
+            <a:pPr lvl="1"/>
+            <a:r>
+              <a:rPr lang="en-GB" i="1" dirty="0" err="1"/>
+              <a:t>Kube</a:t>
+            </a:r>
+            <a:r>
+              <a:rPr lang="en-GB" i="1" dirty="0"/>
+              <a:t> Scheduler</a:t>
+            </a:r>
+          </a:p>
+          <a:p>
+            <a:pPr lvl="1"/>
+            <a:r>
+              <a:rPr lang="en-GB" i="1" dirty="0" err="1"/>
+              <a:t>Kubelets</a:t>
+            </a:r>
+            <a:endParaRPr lang="en-GB" i="1" dirty="0"/>
+          </a:p>
+          <a:p>
+            <a:pPr lvl="1"/>
+            <a:r>
+              <a:rPr lang="en-GB" i="1" dirty="0"/>
+              <a:t>Image Registry</a:t>
+            </a:r>
           </a:p>
           <a:p>
             <a:r>
               <a:rPr lang="en-DE" dirty="0"/>
               <a:t>Orchestration</a:t>
+            </a:r>
+          </a:p>
+          <a:p>
+            <a:pPr lvl="1"/>
+            <a:r>
+              <a:rPr lang="en-DE" dirty="0"/>
+              <a:t>Starting/stoping of applications</a:t>
+            </a:r>
+          </a:p>
+          <a:p>
+            <a:pPr lvl="1"/>
+            <a:r>
+              <a:rPr lang="en-DE" dirty="0"/>
+              <a:t>Scalabilty of applications</a:t>
+            </a:r>
+          </a:p>
+          <a:p>
+            <a:pPr lvl="1"/>
+            <a:r>
+              <a:rPr lang="en-DE" dirty="0"/>
+              <a:t>Load management</a:t>
+            </a:r>
+          </a:p>
+          <a:p>
+            <a:pPr lvl="1"/>
+            <a:r>
+              <a:rPr lang="en-DE" dirty="0"/>
+              <a:t>Health monitoring</a:t>
             </a:r>
           </a:p>
           <a:p>
@@ -5345,6 +5611,42 @@
           </a:p>
         </p:txBody>
       </p:sp>
+      <p:pic>
+        <p:nvPicPr>
+          <p:cNvPr id="5" name="Picture 4" descr="A screenshot of a cell phone&#10;&#10;Description automatically generated">
+            <a:extLst>
+              <a:ext uri="{FF2B5EF4-FFF2-40B4-BE49-F238E27FC236}">
+                <a16:creationId xmlns:a16="http://schemas.microsoft.com/office/drawing/2014/main" id="{229C9C2A-1942-FB4B-9ED2-C41198621056}"/>
+              </a:ext>
+            </a:extLst>
+          </p:cNvPr>
+          <p:cNvPicPr>
+            <a:picLocks noChangeAspect="1"/>
+          </p:cNvPicPr>
+          <p:nvPr/>
+        </p:nvPicPr>
+        <p:blipFill>
+          <a:blip r:embed="rId2">
+            <a:extLst>
+              <a:ext uri="{28A0092B-C50C-407E-A947-70E740481C1C}">
+                <a14:useLocalDpi xmlns:a14="http://schemas.microsoft.com/office/drawing/2010/main" val="0"/>
+              </a:ext>
+            </a:extLst>
+          </a:blip>
+          <a:stretch>
+            <a:fillRect/>
+          </a:stretch>
+        </p:blipFill>
+        <p:spPr>
+          <a:xfrm>
+            <a:off x="5767186" y="2420888"/>
+            <a:ext cx="3176789" cy="3429001"/>
+          </a:xfrm>
+          <a:prstGeom prst="rect">
+            <a:avLst/>
+          </a:prstGeom>
+        </p:spPr>
+      </p:pic>
     </p:spTree>
     <p:extLst>
       <p:ext uri="{BB962C8B-B14F-4D97-AF65-F5344CB8AC3E}">
@@ -5464,9 +5766,69 @@
           </a:p>
           <a:p>
             <a:r>
-              <a:rPr lang="en-DE"/>
-              <a:t>Uses “Affinity/Anti-Affinity rule” and Node labeling</a:t>
-            </a:r>
+              <a:rPr lang="en-DE" dirty="0"/>
+              <a:t>Uses “Affinity/Anti-Affinity rule”</a:t>
+            </a:r>
+          </a:p>
+          <a:p>
+            <a:r>
+              <a:rPr lang="en-DE" dirty="0"/>
+              <a:t>Uses Node labeling for resources</a:t>
+            </a:r>
+          </a:p>
+          <a:p>
+            <a:pPr lvl="1"/>
+            <a:r>
+              <a:rPr lang="en-DE" dirty="0"/>
+              <a:t>Resource: CPU, Memory -&gt; {</a:t>
+            </a:r>
+            <a:r>
+              <a:rPr lang="en-DE" i="1" dirty="0"/>
+              <a:t>Min, High, Medium</a:t>
+            </a:r>
+            <a:r>
+              <a:rPr lang="en-DE" dirty="0"/>
+              <a:t>}</a:t>
+            </a:r>
+          </a:p>
+          <a:p>
+            <a:pPr lvl="1"/>
+            <a:r>
+              <a:rPr lang="en-DE" dirty="0"/>
+              <a:t>Device Type: {</a:t>
+            </a:r>
+            <a:r>
+              <a:rPr lang="en-DE" i="1" dirty="0"/>
+              <a:t>Fog, Cloud</a:t>
+            </a:r>
+            <a:r>
+              <a:rPr lang="en-DE" dirty="0"/>
+              <a:t>}</a:t>
+            </a:r>
+          </a:p>
+          <a:p>
+            <a:pPr lvl="1"/>
+            <a:r>
+              <a:rPr lang="en-DE" dirty="0"/>
+              <a:t>Network delay: RTT tags</a:t>
+            </a:r>
+          </a:p>
+          <a:p>
+            <a:pPr marL="0" indent="0">
+              <a:buNone/>
+            </a:pPr>
+            <a:endParaRPr lang="en-DE" dirty="0"/>
+          </a:p>
+          <a:p>
+            <a:pPr lvl="1"/>
+            <a:endParaRPr lang="en-DE" dirty="0"/>
+          </a:p>
+          <a:p>
+            <a:pPr lvl="1"/>
+            <a:endParaRPr lang="en-DE" dirty="0"/>
+          </a:p>
+          <a:p>
+            <a:endParaRPr lang="en-DE" dirty="0"/>
           </a:p>
           <a:p>
             <a:endParaRPr lang="en-DE" dirty="0"/>
@@ -5480,6 +5842,411 @@
     <p:extLst>
       <p:ext uri="{BB962C8B-B14F-4D97-AF65-F5344CB8AC3E}">
         <p14:creationId xmlns:p14="http://schemas.microsoft.com/office/powerpoint/2010/main" val="3144301980"/>
+      </p:ext>
+    </p:extLst>
+  </p:cSld>
+  <p:clrMapOvr>
+    <a:masterClrMapping/>
+  </p:clrMapOvr>
+</p:sld>
+</file>
+
+<file path=ppt/slides/slide7.xml><?xml version="1.0" encoding="utf-8"?>
+<p:sld xmlns:a="http://schemas.openxmlformats.org/drawingml/2006/main" xmlns:r="http://schemas.openxmlformats.org/officeDocument/2006/relationships" xmlns:p="http://schemas.openxmlformats.org/presentationml/2006/main">
+  <p:cSld>
+    <p:spTree>
+      <p:nvGrpSpPr>
+        <p:cNvPr id="1" name=""/>
+        <p:cNvGrpSpPr/>
+        <p:nvPr/>
+      </p:nvGrpSpPr>
+      <p:grpSpPr>
+        <a:xfrm>
+          <a:off x="0" y="0"/>
+          <a:ext cx="0" cy="0"/>
+          <a:chOff x="0" y="0"/>
+          <a:chExt cx="0" cy="0"/>
+        </a:xfrm>
+      </p:grpSpPr>
+      <p:sp>
+        <p:nvSpPr>
+          <p:cNvPr id="2" name="Title 1">
+            <a:extLst>
+              <a:ext uri="{FF2B5EF4-FFF2-40B4-BE49-F238E27FC236}">
+                <a16:creationId xmlns:a16="http://schemas.microsoft.com/office/drawing/2014/main" id="{A8C80E43-A60F-8047-B99A-1829F32C09DA}"/>
+              </a:ext>
+            </a:extLst>
+          </p:cNvPr>
+          <p:cNvSpPr>
+            <a:spLocks noGrp="1"/>
+          </p:cNvSpPr>
+          <p:nvPr>
+            <p:ph type="title"/>
+          </p:nvPr>
+        </p:nvSpPr>
+        <p:spPr/>
+        <p:txBody>
+          <a:bodyPr/>
+          <a:lstStyle/>
+          <a:p>
+            <a:r>
+              <a:rPr lang="en-DE" dirty="0"/>
+              <a:t>Fog Computing Infrastructure</a:t>
+            </a:r>
+          </a:p>
+        </p:txBody>
+      </p:sp>
+      <p:pic>
+        <p:nvPicPr>
+          <p:cNvPr id="5" name="Content Placeholder 4" descr="A close up of a map&#10;&#10;Description automatically generated">
+            <a:extLst>
+              <a:ext uri="{FF2B5EF4-FFF2-40B4-BE49-F238E27FC236}">
+                <a16:creationId xmlns:a16="http://schemas.microsoft.com/office/drawing/2014/main" id="{B6DC9677-9D59-9E48-8245-B852015D1025}"/>
+              </a:ext>
+            </a:extLst>
+          </p:cNvPr>
+          <p:cNvPicPr>
+            <a:picLocks noGrp="1" noChangeAspect="1"/>
+          </p:cNvPicPr>
+          <p:nvPr>
+            <p:ph idx="1"/>
+          </p:nvPr>
+        </p:nvPicPr>
+        <p:blipFill>
+          <a:blip r:embed="rId2">
+            <a:extLst>
+              <a:ext uri="{28A0092B-C50C-407E-A947-70E740481C1C}">
+                <a14:useLocalDpi xmlns:a14="http://schemas.microsoft.com/office/drawing/2010/main" val="0"/>
+              </a:ext>
+            </a:extLst>
+          </a:blip>
+          <a:stretch>
+            <a:fillRect/>
+          </a:stretch>
+        </p:blipFill>
+        <p:spPr>
+          <a:xfrm>
+            <a:off x="1043608" y="902171"/>
+            <a:ext cx="7026371" cy="5191125"/>
+          </a:xfrm>
+        </p:spPr>
+      </p:pic>
+    </p:spTree>
+    <p:extLst>
+      <p:ext uri="{BB962C8B-B14F-4D97-AF65-F5344CB8AC3E}">
+        <p14:creationId xmlns:p14="http://schemas.microsoft.com/office/powerpoint/2010/main" val="2366732184"/>
+      </p:ext>
+    </p:extLst>
+  </p:cSld>
+  <p:clrMapOvr>
+    <a:masterClrMapping/>
+  </p:clrMapOvr>
+</p:sld>
+</file>
+
+<file path=ppt/slides/slide8.xml><?xml version="1.0" encoding="utf-8"?>
+<p:sld xmlns:a="http://schemas.openxmlformats.org/drawingml/2006/main" xmlns:r="http://schemas.openxmlformats.org/officeDocument/2006/relationships" xmlns:p="http://schemas.openxmlformats.org/presentationml/2006/main">
+  <p:cSld>
+    <p:spTree>
+      <p:nvGrpSpPr>
+        <p:cNvPr id="1" name=""/>
+        <p:cNvGrpSpPr/>
+        <p:nvPr/>
+      </p:nvGrpSpPr>
+      <p:grpSpPr>
+        <a:xfrm>
+          <a:off x="0" y="0"/>
+          <a:ext cx="0" cy="0"/>
+          <a:chOff x="0" y="0"/>
+          <a:chExt cx="0" cy="0"/>
+        </a:xfrm>
+      </p:grpSpPr>
+      <p:sp>
+        <p:nvSpPr>
+          <p:cNvPr id="2" name="Title 1">
+            <a:extLst>
+              <a:ext uri="{FF2B5EF4-FFF2-40B4-BE49-F238E27FC236}">
+                <a16:creationId xmlns:a16="http://schemas.microsoft.com/office/drawing/2014/main" id="{B83074A1-1315-3049-88C6-A63F591AC8A7}"/>
+              </a:ext>
+            </a:extLst>
+          </p:cNvPr>
+          <p:cNvSpPr>
+            <a:spLocks noGrp="1"/>
+          </p:cNvSpPr>
+          <p:nvPr>
+            <p:ph type="title"/>
+          </p:nvPr>
+        </p:nvSpPr>
+        <p:spPr/>
+        <p:txBody>
+          <a:bodyPr/>
+          <a:lstStyle/>
+          <a:p>
+            <a:r>
+              <a:rPr lang="en-DE" dirty="0"/>
+              <a:t>Evaluation of Network-based Scheduler</a:t>
+            </a:r>
+          </a:p>
+        </p:txBody>
+      </p:sp>
+      <p:sp>
+        <p:nvSpPr>
+          <p:cNvPr id="3" name="Content Placeholder 2">
+            <a:extLst>
+              <a:ext uri="{FF2B5EF4-FFF2-40B4-BE49-F238E27FC236}">
+                <a16:creationId xmlns:a16="http://schemas.microsoft.com/office/drawing/2014/main" id="{BCF752C1-1B46-F942-960D-9D0651611066}"/>
+              </a:ext>
+            </a:extLst>
+          </p:cNvPr>
+          <p:cNvSpPr>
+            <a:spLocks noGrp="1"/>
+          </p:cNvSpPr>
+          <p:nvPr>
+            <p:ph idx="1"/>
+          </p:nvPr>
+        </p:nvSpPr>
+        <p:spPr/>
+        <p:txBody>
+          <a:bodyPr/>
+          <a:lstStyle/>
+          <a:p>
+            <a:r>
+              <a:rPr lang="en-DE" dirty="0"/>
+              <a:t>Smart City Scenario</a:t>
+            </a:r>
+          </a:p>
+          <a:p>
+            <a:r>
+              <a:rPr lang="en-DE" dirty="0"/>
+              <a:t>Comparison of Three Schedulers</a:t>
+            </a:r>
+          </a:p>
+          <a:p>
+            <a:pPr lvl="1"/>
+            <a:r>
+              <a:rPr lang="en-DE" i="1" dirty="0"/>
+              <a:t>Kube Scheduler</a:t>
+            </a:r>
+          </a:p>
+          <a:p>
+            <a:pPr lvl="1"/>
+            <a:r>
+              <a:rPr lang="en-DE" dirty="0"/>
+              <a:t>Network-based Scheduler</a:t>
+            </a:r>
+          </a:p>
+          <a:p>
+            <a:pPr lvl="1"/>
+            <a:r>
+              <a:rPr lang="en-DE" dirty="0"/>
+              <a:t>Random Scheduler</a:t>
+            </a:r>
+          </a:p>
+          <a:p>
+            <a:endParaRPr lang="en-DE" dirty="0"/>
+          </a:p>
+        </p:txBody>
+      </p:sp>
+      <p:pic>
+        <p:nvPicPr>
+          <p:cNvPr id="5" name="Picture 4" descr="A picture containing screenshot, cabinet&#10;&#10;Description automatically generated">
+            <a:extLst>
+              <a:ext uri="{FF2B5EF4-FFF2-40B4-BE49-F238E27FC236}">
+                <a16:creationId xmlns:a16="http://schemas.microsoft.com/office/drawing/2014/main" id="{5BFD7BD4-4CEC-FC42-8A58-E3FAFABAA39E}"/>
+              </a:ext>
+            </a:extLst>
+          </p:cNvPr>
+          <p:cNvPicPr>
+            <a:picLocks noChangeAspect="1"/>
+          </p:cNvPicPr>
+          <p:nvPr/>
+        </p:nvPicPr>
+        <p:blipFill>
+          <a:blip r:embed="rId2">
+            <a:extLst>
+              <a:ext uri="{28A0092B-C50C-407E-A947-70E740481C1C}">
+                <a14:useLocalDpi xmlns:a14="http://schemas.microsoft.com/office/drawing/2010/main" val="0"/>
+              </a:ext>
+            </a:extLst>
+          </a:blip>
+          <a:stretch>
+            <a:fillRect/>
+          </a:stretch>
+        </p:blipFill>
+        <p:spPr>
+          <a:xfrm>
+            <a:off x="5652120" y="811464"/>
+            <a:ext cx="3470127" cy="5132136"/>
+          </a:xfrm>
+          <a:prstGeom prst="rect">
+            <a:avLst/>
+          </a:prstGeom>
+        </p:spPr>
+      </p:pic>
+      <p:pic>
+        <p:nvPicPr>
+          <p:cNvPr id="7" name="Picture 6" descr="A screenshot of a cell phone&#10;&#10;Description automatically generated">
+            <a:extLst>
+              <a:ext uri="{FF2B5EF4-FFF2-40B4-BE49-F238E27FC236}">
+                <a16:creationId xmlns:a16="http://schemas.microsoft.com/office/drawing/2014/main" id="{77890254-F47B-A643-8C46-488CC5A19BE5}"/>
+              </a:ext>
+            </a:extLst>
+          </p:cNvPr>
+          <p:cNvPicPr>
+            <a:picLocks noChangeAspect="1"/>
+          </p:cNvPicPr>
+          <p:nvPr/>
+        </p:nvPicPr>
+        <p:blipFill>
+          <a:blip r:embed="rId3">
+            <a:extLst>
+              <a:ext uri="{28A0092B-C50C-407E-A947-70E740481C1C}">
+                <a14:useLocalDpi xmlns:a14="http://schemas.microsoft.com/office/drawing/2010/main" val="0"/>
+              </a:ext>
+            </a:extLst>
+          </a:blip>
+          <a:stretch>
+            <a:fillRect/>
+          </a:stretch>
+        </p:blipFill>
+        <p:spPr>
+          <a:xfrm>
+            <a:off x="650082" y="4820598"/>
+            <a:ext cx="4641998" cy="984666"/>
+          </a:xfrm>
+          <a:prstGeom prst="rect">
+            <a:avLst/>
+          </a:prstGeom>
+        </p:spPr>
+      </p:pic>
+    </p:spTree>
+    <p:extLst>
+      <p:ext uri="{BB962C8B-B14F-4D97-AF65-F5344CB8AC3E}">
+        <p14:creationId xmlns:p14="http://schemas.microsoft.com/office/powerpoint/2010/main" val="2690771089"/>
+      </p:ext>
+    </p:extLst>
+  </p:cSld>
+  <p:clrMapOvr>
+    <a:masterClrMapping/>
+  </p:clrMapOvr>
+</p:sld>
+</file>
+
+<file path=ppt/slides/slide9.xml><?xml version="1.0" encoding="utf-8"?>
+<p:sld xmlns:a="http://schemas.openxmlformats.org/drawingml/2006/main" xmlns:r="http://schemas.openxmlformats.org/officeDocument/2006/relationships" xmlns:p="http://schemas.openxmlformats.org/presentationml/2006/main">
+  <p:cSld>
+    <p:spTree>
+      <p:nvGrpSpPr>
+        <p:cNvPr id="1" name=""/>
+        <p:cNvGrpSpPr/>
+        <p:nvPr/>
+      </p:nvGrpSpPr>
+      <p:grpSpPr>
+        <a:xfrm>
+          <a:off x="0" y="0"/>
+          <a:ext cx="0" cy="0"/>
+          <a:chOff x="0" y="0"/>
+          <a:chExt cx="0" cy="0"/>
+        </a:xfrm>
+      </p:grpSpPr>
+      <p:sp>
+        <p:nvSpPr>
+          <p:cNvPr id="2" name="Title 1">
+            <a:extLst>
+              <a:ext uri="{FF2B5EF4-FFF2-40B4-BE49-F238E27FC236}">
+                <a16:creationId xmlns:a16="http://schemas.microsoft.com/office/drawing/2014/main" id="{BBA30D2F-C8B3-AD4A-8075-FB767E25C76F}"/>
+              </a:ext>
+            </a:extLst>
+          </p:cNvPr>
+          <p:cNvSpPr>
+            <a:spLocks noGrp="1"/>
+          </p:cNvSpPr>
+          <p:nvPr>
+            <p:ph type="title"/>
+          </p:nvPr>
+        </p:nvSpPr>
+        <p:spPr/>
+        <p:txBody>
+          <a:bodyPr/>
+          <a:lstStyle/>
+          <a:p>
+            <a:r>
+              <a:rPr lang="en-DE" dirty="0"/>
+              <a:t>Comparsion</a:t>
+            </a:r>
+          </a:p>
+        </p:txBody>
+      </p:sp>
+      <p:sp>
+        <p:nvSpPr>
+          <p:cNvPr id="3" name="Content Placeholder 2">
+            <a:extLst>
+              <a:ext uri="{FF2B5EF4-FFF2-40B4-BE49-F238E27FC236}">
+                <a16:creationId xmlns:a16="http://schemas.microsoft.com/office/drawing/2014/main" id="{661B9DFE-713E-B04C-A9B1-DDD10F8FA7CE}"/>
+              </a:ext>
+            </a:extLst>
+          </p:cNvPr>
+          <p:cNvSpPr>
+            <a:spLocks noGrp="1"/>
+          </p:cNvSpPr>
+          <p:nvPr>
+            <p:ph idx="1"/>
+          </p:nvPr>
+        </p:nvSpPr>
+        <p:spPr/>
+        <p:txBody>
+          <a:bodyPr/>
+          <a:lstStyle/>
+          <a:p>
+            <a:r>
+              <a:rPr lang="en-DE" dirty="0"/>
+              <a:t>Based on Orchestrator</a:t>
+            </a:r>
+          </a:p>
+          <a:p>
+            <a:pPr lvl="1"/>
+            <a:r>
+              <a:rPr lang="en-DE" dirty="0"/>
+              <a:t>Fogernetes</a:t>
+            </a:r>
+          </a:p>
+          <a:p>
+            <a:pPr lvl="1"/>
+            <a:r>
+              <a:rPr lang="en-DE" dirty="0"/>
+              <a:t>Docker Swarm</a:t>
+            </a:r>
+          </a:p>
+          <a:p>
+            <a:r>
+              <a:rPr lang="en-DE" dirty="0"/>
+              <a:t>Based on Scheduling Techniques</a:t>
+            </a:r>
+          </a:p>
+          <a:p>
+            <a:pPr lvl="1"/>
+            <a:r>
+              <a:rPr lang="en-DE" dirty="0"/>
+              <a:t>Technique One [paper ref]</a:t>
+            </a:r>
+          </a:p>
+          <a:p>
+            <a:pPr lvl="1"/>
+            <a:r>
+              <a:rPr lang="en-DE" dirty="0"/>
+              <a:t>Techniques Two [paper ref]</a:t>
+            </a:r>
+          </a:p>
+          <a:p>
+            <a:pPr lvl="1"/>
+            <a:endParaRPr lang="en-DE" dirty="0"/>
+          </a:p>
+        </p:txBody>
+      </p:sp>
+    </p:spTree>
+    <p:extLst>
+      <p:ext uri="{BB962C8B-B14F-4D97-AF65-F5344CB8AC3E}">
+        <p14:creationId xmlns:p14="http://schemas.microsoft.com/office/powerpoint/2010/main" val="3010451804"/>
       </p:ext>
     </p:extLst>
   </p:cSld>

</xml_diff>